<commit_message>
Git Push 2025-05-07 15:25:24.22
</commit_message>
<xml_diff>
--- a/UIUX/teamProject/04_29/신치윤_환경분석_벤치마킹.pptx
+++ b/UIUX/teamProject/04_29/신치윤_환경분석_벤치마킹.pptx
@@ -111,6 +111,11 @@
       </a:defRPr>
     </a:lvl9pPr>
   </p:defaultTextStyle>
+  <p:extLst>
+    <p:ext uri="{EFAFB233-063F-42B5-8137-9DF3F51BA10A}">
+      <p15:sldGuideLst xmlns:p15="http://schemas.microsoft.com/office/powerpoint/2012/main"/>
+    </p:ext>
+  </p:extLst>
 </p:presentation>
 </file>
 
@@ -261,7 +266,7 @@
           <a:p>
             <a:fld id="{E1EB2FA0-33CC-49D9-B59D-FCBC783D583C}" type="datetimeFigureOut">
               <a:rPr lang="ko-KR" altLang="en-US" smtClean="0"/>
-              <a:t>2025-04-29</a:t>
+              <a:t>2025-05-07</a:t>
             </a:fld>
             <a:endParaRPr lang="ko-KR" altLang="en-US"/>
           </a:p>
@@ -459,7 +464,7 @@
           <a:p>
             <a:fld id="{E1EB2FA0-33CC-49D9-B59D-FCBC783D583C}" type="datetimeFigureOut">
               <a:rPr lang="ko-KR" altLang="en-US" smtClean="0"/>
-              <a:t>2025-04-29</a:t>
+              <a:t>2025-05-07</a:t>
             </a:fld>
             <a:endParaRPr lang="ko-KR" altLang="en-US"/>
           </a:p>
@@ -667,7 +672,7 @@
           <a:p>
             <a:fld id="{E1EB2FA0-33CC-49D9-B59D-FCBC783D583C}" type="datetimeFigureOut">
               <a:rPr lang="ko-KR" altLang="en-US" smtClean="0"/>
-              <a:t>2025-04-29</a:t>
+              <a:t>2025-05-07</a:t>
             </a:fld>
             <a:endParaRPr lang="ko-KR" altLang="en-US"/>
           </a:p>
@@ -865,7 +870,7 @@
           <a:p>
             <a:fld id="{E1EB2FA0-33CC-49D9-B59D-FCBC783D583C}" type="datetimeFigureOut">
               <a:rPr lang="ko-KR" altLang="en-US" smtClean="0"/>
-              <a:t>2025-04-29</a:t>
+              <a:t>2025-05-07</a:t>
             </a:fld>
             <a:endParaRPr lang="ko-KR" altLang="en-US"/>
           </a:p>
@@ -1140,7 +1145,7 @@
           <a:p>
             <a:fld id="{E1EB2FA0-33CC-49D9-B59D-FCBC783D583C}" type="datetimeFigureOut">
               <a:rPr lang="ko-KR" altLang="en-US" smtClean="0"/>
-              <a:t>2025-04-29</a:t>
+              <a:t>2025-05-07</a:t>
             </a:fld>
             <a:endParaRPr lang="ko-KR" altLang="en-US"/>
           </a:p>
@@ -1405,7 +1410,7 @@
           <a:p>
             <a:fld id="{E1EB2FA0-33CC-49D9-B59D-FCBC783D583C}" type="datetimeFigureOut">
               <a:rPr lang="ko-KR" altLang="en-US" smtClean="0"/>
-              <a:t>2025-04-29</a:t>
+              <a:t>2025-05-07</a:t>
             </a:fld>
             <a:endParaRPr lang="ko-KR" altLang="en-US"/>
           </a:p>
@@ -1817,7 +1822,7 @@
           <a:p>
             <a:fld id="{E1EB2FA0-33CC-49D9-B59D-FCBC783D583C}" type="datetimeFigureOut">
               <a:rPr lang="ko-KR" altLang="en-US" smtClean="0"/>
-              <a:t>2025-04-29</a:t>
+              <a:t>2025-05-07</a:t>
             </a:fld>
             <a:endParaRPr lang="ko-KR" altLang="en-US"/>
           </a:p>
@@ -1958,7 +1963,7 @@
           <a:p>
             <a:fld id="{E1EB2FA0-33CC-49D9-B59D-FCBC783D583C}" type="datetimeFigureOut">
               <a:rPr lang="ko-KR" altLang="en-US" smtClean="0"/>
-              <a:t>2025-04-29</a:t>
+              <a:t>2025-05-07</a:t>
             </a:fld>
             <a:endParaRPr lang="ko-KR" altLang="en-US"/>
           </a:p>
@@ -2071,7 +2076,7 @@
           <a:p>
             <a:fld id="{E1EB2FA0-33CC-49D9-B59D-FCBC783D583C}" type="datetimeFigureOut">
               <a:rPr lang="ko-KR" altLang="en-US" smtClean="0"/>
-              <a:t>2025-04-29</a:t>
+              <a:t>2025-05-07</a:t>
             </a:fld>
             <a:endParaRPr lang="ko-KR" altLang="en-US"/>
           </a:p>
@@ -2382,7 +2387,7 @@
           <a:p>
             <a:fld id="{E1EB2FA0-33CC-49D9-B59D-FCBC783D583C}" type="datetimeFigureOut">
               <a:rPr lang="ko-KR" altLang="en-US" smtClean="0"/>
-              <a:t>2025-04-29</a:t>
+              <a:t>2025-05-07</a:t>
             </a:fld>
             <a:endParaRPr lang="ko-KR" altLang="en-US"/>
           </a:p>
@@ -2670,7 +2675,7 @@
           <a:p>
             <a:fld id="{E1EB2FA0-33CC-49D9-B59D-FCBC783D583C}" type="datetimeFigureOut">
               <a:rPr lang="ko-KR" altLang="en-US" smtClean="0"/>
-              <a:t>2025-04-29</a:t>
+              <a:t>2025-05-07</a:t>
             </a:fld>
             <a:endParaRPr lang="ko-KR" altLang="en-US"/>
           </a:p>
@@ -2911,7 +2916,7 @@
           <a:p>
             <a:fld id="{E1EB2FA0-33CC-49D9-B59D-FCBC783D583C}" type="datetimeFigureOut">
               <a:rPr lang="ko-KR" altLang="en-US" smtClean="0"/>
-              <a:t>2025-04-29</a:t>
+              <a:t>2025-05-07</a:t>
             </a:fld>
             <a:endParaRPr lang="ko-KR" altLang="en-US"/>
           </a:p>

</xml_diff>